<commit_message>
add assignment for day 3
</commit_message>
<xml_diff>
--- a/enlight_month/A2/7色板分析.pptx
+++ b/enlight_month/A2/7色板分析.pptx
@@ -7,6 +7,7 @@
   <p:sldIdLst>
     <p:sldId id="256" r:id="rId2"/>
     <p:sldId id="257" r:id="rId3"/>
+    <p:sldId id="258" r:id="rId4"/>
   </p:sldIdLst>
   <p:sldSz cx="12192000" cy="6858000"/>
   <p:notesSz cx="6858000" cy="9144000"/>
@@ -105,6 +106,11 @@
       </a:defRPr>
     </a:lvl9pPr>
   </p:defaultTextStyle>
+  <p:extLst>
+    <p:ext uri="{EFAFB233-063F-42B5-8137-9DF3F51BA10A}">
+      <p15:sldGuideLst xmlns:p15="http://schemas.microsoft.com/office/powerpoint/2012/main"/>
+    </p:ext>
+  </p:extLst>
 </p:presentation>
 </file>
 
@@ -255,7 +261,7 @@
           <a:p>
             <a:fld id="{3BB06982-0E52-4780-8911-C96F136F2D21}" type="datetimeFigureOut">
               <a:rPr lang="zh-CN" altLang="en-US" smtClean="0"/>
-              <a:t>2018/9/18</a:t>
+              <a:t>2018/9/19</a:t>
             </a:fld>
             <a:endParaRPr lang="zh-CN" altLang="en-US"/>
           </a:p>
@@ -453,7 +459,7 @@
           <a:p>
             <a:fld id="{3BB06982-0E52-4780-8911-C96F136F2D21}" type="datetimeFigureOut">
               <a:rPr lang="zh-CN" altLang="en-US" smtClean="0"/>
-              <a:t>2018/9/18</a:t>
+              <a:t>2018/9/19</a:t>
             </a:fld>
             <a:endParaRPr lang="zh-CN" altLang="en-US"/>
           </a:p>
@@ -661,7 +667,7 @@
           <a:p>
             <a:fld id="{3BB06982-0E52-4780-8911-C96F136F2D21}" type="datetimeFigureOut">
               <a:rPr lang="zh-CN" altLang="en-US" smtClean="0"/>
-              <a:t>2018/9/18</a:t>
+              <a:t>2018/9/19</a:t>
             </a:fld>
             <a:endParaRPr lang="zh-CN" altLang="en-US"/>
           </a:p>
@@ -859,7 +865,7 @@
           <a:p>
             <a:fld id="{3BB06982-0E52-4780-8911-C96F136F2D21}" type="datetimeFigureOut">
               <a:rPr lang="zh-CN" altLang="en-US" smtClean="0"/>
-              <a:t>2018/9/18</a:t>
+              <a:t>2018/9/19</a:t>
             </a:fld>
             <a:endParaRPr lang="zh-CN" altLang="en-US"/>
           </a:p>
@@ -1134,7 +1140,7 @@
           <a:p>
             <a:fld id="{3BB06982-0E52-4780-8911-C96F136F2D21}" type="datetimeFigureOut">
               <a:rPr lang="zh-CN" altLang="en-US" smtClean="0"/>
-              <a:t>2018/9/18</a:t>
+              <a:t>2018/9/19</a:t>
             </a:fld>
             <a:endParaRPr lang="zh-CN" altLang="en-US"/>
           </a:p>
@@ -1399,7 +1405,7 @@
           <a:p>
             <a:fld id="{3BB06982-0E52-4780-8911-C96F136F2D21}" type="datetimeFigureOut">
               <a:rPr lang="zh-CN" altLang="en-US" smtClean="0"/>
-              <a:t>2018/9/18</a:t>
+              <a:t>2018/9/19</a:t>
             </a:fld>
             <a:endParaRPr lang="zh-CN" altLang="en-US"/>
           </a:p>
@@ -1811,7 +1817,7 @@
           <a:p>
             <a:fld id="{3BB06982-0E52-4780-8911-C96F136F2D21}" type="datetimeFigureOut">
               <a:rPr lang="zh-CN" altLang="en-US" smtClean="0"/>
-              <a:t>2018/9/18</a:t>
+              <a:t>2018/9/19</a:t>
             </a:fld>
             <a:endParaRPr lang="zh-CN" altLang="en-US"/>
           </a:p>
@@ -1952,7 +1958,7 @@
           <a:p>
             <a:fld id="{3BB06982-0E52-4780-8911-C96F136F2D21}" type="datetimeFigureOut">
               <a:rPr lang="zh-CN" altLang="en-US" smtClean="0"/>
-              <a:t>2018/9/18</a:t>
+              <a:t>2018/9/19</a:t>
             </a:fld>
             <a:endParaRPr lang="zh-CN" altLang="en-US"/>
           </a:p>
@@ -2065,7 +2071,7 @@
           <a:p>
             <a:fld id="{3BB06982-0E52-4780-8911-C96F136F2D21}" type="datetimeFigureOut">
               <a:rPr lang="zh-CN" altLang="en-US" smtClean="0"/>
-              <a:t>2018/9/18</a:t>
+              <a:t>2018/9/19</a:t>
             </a:fld>
             <a:endParaRPr lang="zh-CN" altLang="en-US"/>
           </a:p>
@@ -2376,7 +2382,7 @@
           <a:p>
             <a:fld id="{3BB06982-0E52-4780-8911-C96F136F2D21}" type="datetimeFigureOut">
               <a:rPr lang="zh-CN" altLang="en-US" smtClean="0"/>
-              <a:t>2018/9/18</a:t>
+              <a:t>2018/9/19</a:t>
             </a:fld>
             <a:endParaRPr lang="zh-CN" altLang="en-US"/>
           </a:p>
@@ -2664,7 +2670,7 @@
           <a:p>
             <a:fld id="{3BB06982-0E52-4780-8911-C96F136F2D21}" type="datetimeFigureOut">
               <a:rPr lang="zh-CN" altLang="en-US" smtClean="0"/>
-              <a:t>2018/9/18</a:t>
+              <a:t>2018/9/19</a:t>
             </a:fld>
             <a:endParaRPr lang="zh-CN" altLang="en-US"/>
           </a:p>
@@ -2905,7 +2911,7 @@
           <a:p>
             <a:fld id="{3BB06982-0E52-4780-8911-C96F136F2D21}" type="datetimeFigureOut">
               <a:rPr lang="zh-CN" altLang="en-US" smtClean="0"/>
-              <a:t>2018/9/18</a:t>
+              <a:t>2018/9/19</a:t>
             </a:fld>
             <a:endParaRPr lang="zh-CN" altLang="en-US"/>
           </a:p>
@@ -5754,6 +5760,1023 @@
 </p:sld>
 </file>
 
+<file path=ppt/slides/slide3.xml><?xml version="1.0" encoding="utf-8"?>
+<p:sld xmlns:a="http://schemas.openxmlformats.org/drawingml/2006/main" xmlns:r="http://schemas.openxmlformats.org/officeDocument/2006/relationships" xmlns:p="http://schemas.openxmlformats.org/presentationml/2006/main">
+  <p:cSld>
+    <p:spTree>
+      <p:nvGrpSpPr>
+        <p:cNvPr id="1" name=""/>
+        <p:cNvGrpSpPr/>
+        <p:nvPr/>
+      </p:nvGrpSpPr>
+      <p:grpSpPr>
+        <a:xfrm>
+          <a:off x="0" y="0"/>
+          <a:ext cx="0" cy="0"/>
+          <a:chOff x="0" y="0"/>
+          <a:chExt cx="0" cy="0"/>
+        </a:xfrm>
+      </p:grpSpPr>
+      <p:sp>
+        <p:nvSpPr>
+          <p:cNvPr id="22" name="矩形 21">
+            <a:extLst>
+              <a:ext uri="{FF2B5EF4-FFF2-40B4-BE49-F238E27FC236}">
+                <a16:creationId xmlns:a16="http://schemas.microsoft.com/office/drawing/2014/main" id="{29B81924-4C17-4446-B01A-F06BCA30BD47}"/>
+              </a:ext>
+            </a:extLst>
+          </p:cNvPr>
+          <p:cNvSpPr/>
+          <p:nvPr/>
+        </p:nvSpPr>
+        <p:spPr>
+          <a:xfrm>
+            <a:off x="1234424" y="5181600"/>
+            <a:ext cx="4861575" cy="1476374"/>
+          </a:xfrm>
+          <a:prstGeom prst="rect">
+            <a:avLst/>
+          </a:prstGeom>
+          <a:noFill/>
+          <a:ln w="19050">
+            <a:solidFill>
+              <a:schemeClr val="tx1"/>
+            </a:solidFill>
+            <a:prstDash val="lgDash"/>
+          </a:ln>
+        </p:spPr>
+        <p:style>
+          <a:lnRef idx="2">
+            <a:schemeClr val="accent1">
+              <a:shade val="50000"/>
+            </a:schemeClr>
+          </a:lnRef>
+          <a:fillRef idx="1">
+            <a:schemeClr val="accent1"/>
+          </a:fillRef>
+          <a:effectRef idx="0">
+            <a:schemeClr val="accent1"/>
+          </a:effectRef>
+          <a:fontRef idx="minor">
+            <a:schemeClr val="lt1"/>
+          </a:fontRef>
+        </p:style>
+        <p:txBody>
+          <a:bodyPr rtlCol="0" anchor="ctr"/>
+          <a:lstStyle/>
+          <a:p>
+            <a:pPr algn="ctr"/>
+            <a:r>
+              <a:rPr lang="en-US" altLang="zh-CN" sz="2400" b="1" dirty="0">
+                <a:solidFill>
+                  <a:schemeClr val="tx1"/>
+                </a:solidFill>
+                <a:latin typeface="华文楷体" panose="02010600040101010101" pitchFamily="2" charset="-122"/>
+                <a:ea typeface="华文楷体" panose="02010600040101010101" pitchFamily="2" charset="-122"/>
+              </a:rPr>
+              <a:t>Step1 </a:t>
+            </a:r>
+            <a:r>
+              <a:rPr lang="zh-CN" altLang="en-US" sz="2400" b="1" dirty="0">
+                <a:solidFill>
+                  <a:schemeClr val="tx1"/>
+                </a:solidFill>
+                <a:latin typeface="华文楷体" panose="02010600040101010101" pitchFamily="2" charset="-122"/>
+                <a:ea typeface="华文楷体" panose="02010600040101010101" pitchFamily="2" charset="-122"/>
+              </a:rPr>
+              <a:t>专业能力</a:t>
+            </a:r>
+            <a:endParaRPr lang="zh-CN" altLang="en-US" sz="2400" dirty="0">
+              <a:solidFill>
+                <a:schemeClr val="tx1"/>
+              </a:solidFill>
+            </a:endParaRPr>
+          </a:p>
+        </p:txBody>
+      </p:sp>
+      <p:sp>
+        <p:nvSpPr>
+          <p:cNvPr id="16" name="矩形 15">
+            <a:extLst>
+              <a:ext uri="{FF2B5EF4-FFF2-40B4-BE49-F238E27FC236}">
+                <a16:creationId xmlns:a16="http://schemas.microsoft.com/office/drawing/2014/main" id="{1E8C42B9-4D00-4160-9C64-D67FE9834A70}"/>
+              </a:ext>
+            </a:extLst>
+          </p:cNvPr>
+          <p:cNvSpPr/>
+          <p:nvPr/>
+        </p:nvSpPr>
+        <p:spPr>
+          <a:xfrm>
+            <a:off x="1265390" y="457200"/>
+            <a:ext cx="8716810" cy="2133600"/>
+          </a:xfrm>
+          <a:prstGeom prst="rect">
+            <a:avLst/>
+          </a:prstGeom>
+          <a:noFill/>
+          <a:ln w="28575">
+            <a:solidFill>
+              <a:schemeClr val="tx1"/>
+            </a:solidFill>
+            <a:prstDash val="dash"/>
+          </a:ln>
+        </p:spPr>
+        <p:style>
+          <a:lnRef idx="2">
+            <a:schemeClr val="accent1">
+              <a:shade val="50000"/>
+            </a:schemeClr>
+          </a:lnRef>
+          <a:fillRef idx="1">
+            <a:schemeClr val="accent1"/>
+          </a:fillRef>
+          <a:effectRef idx="0">
+            <a:schemeClr val="accent1"/>
+          </a:effectRef>
+          <a:fontRef idx="minor">
+            <a:schemeClr val="lt1"/>
+          </a:fontRef>
+        </p:style>
+        <p:txBody>
+          <a:bodyPr rtlCol="0" anchor="ctr"/>
+          <a:lstStyle/>
+          <a:p>
+            <a:pPr algn="ctr"/>
+            <a:r>
+              <a:rPr lang="en-US" altLang="zh-CN" sz="2800" b="1" dirty="0">
+                <a:solidFill>
+                  <a:schemeClr val="tx1">
+                    <a:lumMod val="50000"/>
+                    <a:lumOff val="50000"/>
+                  </a:schemeClr>
+                </a:solidFill>
+                <a:latin typeface="华文楷体" panose="02010600040101010101" pitchFamily="2" charset="-122"/>
+                <a:ea typeface="华文楷体" panose="02010600040101010101" pitchFamily="2" charset="-122"/>
+              </a:rPr>
+              <a:t>Step7 </a:t>
+            </a:r>
+            <a:r>
+              <a:rPr lang="zh-CN" altLang="en-US" sz="2800" b="1" dirty="0">
+                <a:solidFill>
+                  <a:schemeClr val="tx1">
+                    <a:lumMod val="50000"/>
+                    <a:lumOff val="50000"/>
+                  </a:schemeClr>
+                </a:solidFill>
+                <a:latin typeface="华文楷体" panose="02010600040101010101" pitchFamily="2" charset="-122"/>
+                <a:ea typeface="华文楷体" panose="02010600040101010101" pitchFamily="2" charset="-122"/>
+              </a:rPr>
+              <a:t>经营能力</a:t>
+            </a:r>
+            <a:endParaRPr lang="en-US" altLang="zh-CN" sz="2800" b="1" dirty="0">
+              <a:solidFill>
+                <a:schemeClr val="tx1">
+                  <a:lumMod val="50000"/>
+                  <a:lumOff val="50000"/>
+                </a:schemeClr>
+              </a:solidFill>
+              <a:latin typeface="华文楷体" panose="02010600040101010101" pitchFamily="2" charset="-122"/>
+              <a:ea typeface="华文楷体" panose="02010600040101010101" pitchFamily="2" charset="-122"/>
+            </a:endParaRPr>
+          </a:p>
+          <a:p>
+            <a:pPr algn="ctr"/>
+            <a:r>
+              <a:rPr lang="zh-CN" altLang="en-US" sz="2800" b="1" dirty="0">
+                <a:solidFill>
+                  <a:schemeClr val="tx1">
+                    <a:lumMod val="50000"/>
+                    <a:lumOff val="50000"/>
+                  </a:schemeClr>
+                </a:solidFill>
+                <a:latin typeface="华文楷体" panose="02010600040101010101" pitchFamily="2" charset="-122"/>
+                <a:ea typeface="华文楷体" panose="02010600040101010101" pitchFamily="2" charset="-122"/>
+              </a:rPr>
+              <a:t>行业</a:t>
+            </a:r>
+            <a:r>
+              <a:rPr lang="en-US" altLang="zh-CN" sz="2800" b="1" dirty="0">
+                <a:solidFill>
+                  <a:schemeClr val="tx1">
+                    <a:lumMod val="50000"/>
+                    <a:lumOff val="50000"/>
+                  </a:schemeClr>
+                </a:solidFill>
+                <a:latin typeface="华文楷体" panose="02010600040101010101" pitchFamily="2" charset="-122"/>
+                <a:ea typeface="华文楷体" panose="02010600040101010101" pitchFamily="2" charset="-122"/>
+              </a:rPr>
+              <a:t>/</a:t>
+            </a:r>
+            <a:r>
+              <a:rPr lang="zh-CN" altLang="en-US" sz="2800" b="1" dirty="0">
+                <a:solidFill>
+                  <a:schemeClr val="tx1">
+                    <a:lumMod val="50000"/>
+                    <a:lumOff val="50000"/>
+                  </a:schemeClr>
+                </a:solidFill>
+                <a:latin typeface="华文楷体" panose="02010600040101010101" pitchFamily="2" charset="-122"/>
+                <a:ea typeface="华文楷体" panose="02010600040101010101" pitchFamily="2" charset="-122"/>
+              </a:rPr>
+              <a:t>战略（含商业模式）</a:t>
+            </a:r>
+            <a:r>
+              <a:rPr lang="en-US" altLang="zh-CN" sz="2800" b="1" dirty="0">
+                <a:solidFill>
+                  <a:schemeClr val="tx1">
+                    <a:lumMod val="50000"/>
+                    <a:lumOff val="50000"/>
+                  </a:schemeClr>
+                </a:solidFill>
+                <a:latin typeface="华文楷体" panose="02010600040101010101" pitchFamily="2" charset="-122"/>
+                <a:ea typeface="华文楷体" panose="02010600040101010101" pitchFamily="2" charset="-122"/>
+              </a:rPr>
+              <a:t>/</a:t>
+            </a:r>
+            <a:r>
+              <a:rPr lang="zh-CN" altLang="en-US" sz="2800" b="1" dirty="0">
+                <a:solidFill>
+                  <a:schemeClr val="tx1">
+                    <a:lumMod val="50000"/>
+                    <a:lumOff val="50000"/>
+                  </a:schemeClr>
+                </a:solidFill>
+                <a:latin typeface="华文楷体" panose="02010600040101010101" pitchFamily="2" charset="-122"/>
+                <a:ea typeface="华文楷体" panose="02010600040101010101" pitchFamily="2" charset="-122"/>
+              </a:rPr>
+              <a:t>业务</a:t>
+            </a:r>
+            <a:endParaRPr lang="en-US" altLang="zh-CN" sz="2800" b="1" dirty="0">
+              <a:solidFill>
+                <a:schemeClr val="tx1">
+                  <a:lumMod val="50000"/>
+                  <a:lumOff val="50000"/>
+                </a:schemeClr>
+              </a:solidFill>
+              <a:latin typeface="华文楷体" panose="02010600040101010101" pitchFamily="2" charset="-122"/>
+              <a:ea typeface="华文楷体" panose="02010600040101010101" pitchFamily="2" charset="-122"/>
+            </a:endParaRPr>
+          </a:p>
+          <a:p>
+            <a:pPr algn="ctr"/>
+            <a:r>
+              <a:rPr lang="zh-CN" altLang="en-US" sz="2800" b="1" dirty="0">
+                <a:solidFill>
+                  <a:schemeClr val="tx1">
+                    <a:lumMod val="50000"/>
+                    <a:lumOff val="50000"/>
+                  </a:schemeClr>
+                </a:solidFill>
+                <a:latin typeface="华文楷体" panose="02010600040101010101" pitchFamily="2" charset="-122"/>
+                <a:ea typeface="华文楷体" panose="02010600040101010101" pitchFamily="2" charset="-122"/>
+              </a:rPr>
+              <a:t>组织架构</a:t>
+            </a:r>
+            <a:r>
+              <a:rPr lang="en-US" altLang="zh-CN" sz="2800" b="1" dirty="0">
+                <a:solidFill>
+                  <a:schemeClr val="tx1">
+                    <a:lumMod val="50000"/>
+                    <a:lumOff val="50000"/>
+                  </a:schemeClr>
+                </a:solidFill>
+                <a:latin typeface="华文楷体" panose="02010600040101010101" pitchFamily="2" charset="-122"/>
+                <a:ea typeface="华文楷体" panose="02010600040101010101" pitchFamily="2" charset="-122"/>
+              </a:rPr>
+              <a:t>/</a:t>
+            </a:r>
+            <a:r>
+              <a:rPr lang="zh-CN" altLang="en-US" sz="2800" b="1" dirty="0">
+                <a:solidFill>
+                  <a:schemeClr val="tx1">
+                    <a:lumMod val="50000"/>
+                    <a:lumOff val="50000"/>
+                  </a:schemeClr>
+                </a:solidFill>
+                <a:latin typeface="华文楷体" panose="02010600040101010101" pitchFamily="2" charset="-122"/>
+                <a:ea typeface="华文楷体" panose="02010600040101010101" pitchFamily="2" charset="-122"/>
+              </a:rPr>
+              <a:t>度量</a:t>
+            </a:r>
+            <a:r>
+              <a:rPr lang="en-US" altLang="zh-CN" sz="2800" b="1" dirty="0">
+                <a:solidFill>
+                  <a:schemeClr val="tx1">
+                    <a:lumMod val="50000"/>
+                    <a:lumOff val="50000"/>
+                  </a:schemeClr>
+                </a:solidFill>
+                <a:latin typeface="华文楷体" panose="02010600040101010101" pitchFamily="2" charset="-122"/>
+                <a:ea typeface="华文楷体" panose="02010600040101010101" pitchFamily="2" charset="-122"/>
+              </a:rPr>
+              <a:t>/</a:t>
+            </a:r>
+            <a:r>
+              <a:rPr lang="zh-CN" altLang="en-US" sz="2800" b="1" dirty="0">
+                <a:solidFill>
+                  <a:schemeClr val="tx1">
+                    <a:lumMod val="50000"/>
+                    <a:lumOff val="50000"/>
+                  </a:schemeClr>
+                </a:solidFill>
+                <a:latin typeface="华文楷体" panose="02010600040101010101" pitchFamily="2" charset="-122"/>
+                <a:ea typeface="华文楷体" panose="02010600040101010101" pitchFamily="2" charset="-122"/>
+              </a:rPr>
+              <a:t>文化内核</a:t>
+            </a:r>
+          </a:p>
+        </p:txBody>
+      </p:sp>
+      <p:sp>
+        <p:nvSpPr>
+          <p:cNvPr id="17" name="矩形 16">
+            <a:extLst>
+              <a:ext uri="{FF2B5EF4-FFF2-40B4-BE49-F238E27FC236}">
+                <a16:creationId xmlns:a16="http://schemas.microsoft.com/office/drawing/2014/main" id="{9A3DF043-1A4E-47F9-A7A7-323824AF0D4C}"/>
+              </a:ext>
+            </a:extLst>
+          </p:cNvPr>
+          <p:cNvSpPr/>
+          <p:nvPr/>
+        </p:nvSpPr>
+        <p:spPr>
+          <a:xfrm>
+            <a:off x="1265390" y="2590800"/>
+            <a:ext cx="8716810" cy="1295400"/>
+          </a:xfrm>
+          <a:prstGeom prst="rect">
+            <a:avLst/>
+          </a:prstGeom>
+          <a:noFill/>
+          <a:ln w="28575">
+            <a:solidFill>
+              <a:schemeClr val="tx1"/>
+            </a:solidFill>
+            <a:prstDash val="dash"/>
+          </a:ln>
+        </p:spPr>
+        <p:style>
+          <a:lnRef idx="2">
+            <a:schemeClr val="accent1">
+              <a:shade val="50000"/>
+            </a:schemeClr>
+          </a:lnRef>
+          <a:fillRef idx="1">
+            <a:schemeClr val="accent1"/>
+          </a:fillRef>
+          <a:effectRef idx="0">
+            <a:schemeClr val="accent1"/>
+          </a:effectRef>
+          <a:fontRef idx="minor">
+            <a:schemeClr val="lt1"/>
+          </a:fontRef>
+        </p:style>
+        <p:txBody>
+          <a:bodyPr rtlCol="0" anchor="ctr"/>
+          <a:lstStyle/>
+          <a:p>
+            <a:pPr algn="ctr"/>
+            <a:r>
+              <a:rPr lang="en-US" altLang="zh-CN" sz="2800" b="1" dirty="0">
+                <a:solidFill>
+                  <a:schemeClr val="tx1">
+                    <a:lumMod val="50000"/>
+                    <a:lumOff val="50000"/>
+                  </a:schemeClr>
+                </a:solidFill>
+                <a:latin typeface="华文楷体" panose="02010600040101010101" pitchFamily="2" charset="-122"/>
+                <a:ea typeface="华文楷体" panose="02010600040101010101" pitchFamily="2" charset="-122"/>
+              </a:rPr>
+              <a:t>Step5/6 </a:t>
+            </a:r>
+            <a:r>
+              <a:rPr lang="zh-CN" altLang="en-US" sz="2800" b="1" dirty="0">
+                <a:solidFill>
+                  <a:schemeClr val="tx1">
+                    <a:lumMod val="50000"/>
+                    <a:lumOff val="50000"/>
+                  </a:schemeClr>
+                </a:solidFill>
+                <a:latin typeface="华文楷体" panose="02010600040101010101" pitchFamily="2" charset="-122"/>
+                <a:ea typeface="华文楷体" panose="02010600040101010101" pitchFamily="2" charset="-122"/>
+              </a:rPr>
+              <a:t>高阶管理能力</a:t>
+            </a:r>
+            <a:endParaRPr lang="en-US" altLang="zh-CN" sz="2800" b="1" dirty="0">
+              <a:solidFill>
+                <a:schemeClr val="tx1">
+                  <a:lumMod val="50000"/>
+                  <a:lumOff val="50000"/>
+                </a:schemeClr>
+              </a:solidFill>
+              <a:latin typeface="华文楷体" panose="02010600040101010101" pitchFamily="2" charset="-122"/>
+              <a:ea typeface="华文楷体" panose="02010600040101010101" pitchFamily="2" charset="-122"/>
+            </a:endParaRPr>
+          </a:p>
+          <a:p>
+            <a:pPr algn="ctr"/>
+            <a:r>
+              <a:rPr lang="zh-CN" altLang="en-US" sz="2800" b="1" dirty="0">
+                <a:solidFill>
+                  <a:schemeClr val="tx1">
+                    <a:lumMod val="50000"/>
+                    <a:lumOff val="50000"/>
+                  </a:schemeClr>
+                </a:solidFill>
+                <a:latin typeface="华文楷体" panose="02010600040101010101" pitchFamily="2" charset="-122"/>
+                <a:ea typeface="华文楷体" panose="02010600040101010101" pitchFamily="2" charset="-122"/>
+              </a:rPr>
+              <a:t>驾驭企业三浪</a:t>
+            </a:r>
+            <a:r>
+              <a:rPr lang="en-US" altLang="zh-CN" sz="2800" b="1" dirty="0">
+                <a:solidFill>
+                  <a:schemeClr val="tx1">
+                    <a:lumMod val="50000"/>
+                    <a:lumOff val="50000"/>
+                  </a:schemeClr>
+                </a:solidFill>
+                <a:latin typeface="华文楷体" panose="02010600040101010101" pitchFamily="2" charset="-122"/>
+                <a:ea typeface="华文楷体" panose="02010600040101010101" pitchFamily="2" charset="-122"/>
+              </a:rPr>
+              <a:t>/</a:t>
+            </a:r>
+            <a:r>
+              <a:rPr lang="zh-CN" altLang="en-US" sz="2800" b="1" dirty="0">
+                <a:solidFill>
+                  <a:schemeClr val="tx1">
+                    <a:lumMod val="50000"/>
+                    <a:lumOff val="50000"/>
+                  </a:schemeClr>
+                </a:solidFill>
+                <a:latin typeface="华文楷体" panose="02010600040101010101" pitchFamily="2" charset="-122"/>
+                <a:ea typeface="华文楷体" panose="02010600040101010101" pitchFamily="2" charset="-122"/>
+              </a:rPr>
+              <a:t>顶层制度设计</a:t>
+            </a:r>
+            <a:r>
+              <a:rPr lang="en-US" altLang="zh-CN" sz="2800" b="1" dirty="0">
+                <a:solidFill>
+                  <a:schemeClr val="tx1">
+                    <a:lumMod val="50000"/>
+                    <a:lumOff val="50000"/>
+                  </a:schemeClr>
+                </a:solidFill>
+                <a:latin typeface="华文楷体" panose="02010600040101010101" pitchFamily="2" charset="-122"/>
+                <a:ea typeface="华文楷体" panose="02010600040101010101" pitchFamily="2" charset="-122"/>
+              </a:rPr>
+              <a:t>/</a:t>
+            </a:r>
+            <a:r>
+              <a:rPr lang="zh-CN" altLang="en-US" sz="2800" b="1" dirty="0">
+                <a:solidFill>
+                  <a:schemeClr val="tx1">
+                    <a:lumMod val="50000"/>
+                    <a:lumOff val="50000"/>
+                  </a:schemeClr>
+                </a:solidFill>
+                <a:latin typeface="华文楷体" panose="02010600040101010101" pitchFamily="2" charset="-122"/>
+                <a:ea typeface="华文楷体" panose="02010600040101010101" pitchFamily="2" charset="-122"/>
+              </a:rPr>
+              <a:t>资源配置</a:t>
+            </a:r>
+            <a:endParaRPr lang="en-US" altLang="zh-CN" sz="2800" b="1" dirty="0">
+              <a:solidFill>
+                <a:schemeClr val="tx1">
+                  <a:lumMod val="50000"/>
+                  <a:lumOff val="50000"/>
+                </a:schemeClr>
+              </a:solidFill>
+              <a:latin typeface="华文楷体" panose="02010600040101010101" pitchFamily="2" charset="-122"/>
+              <a:ea typeface="华文楷体" panose="02010600040101010101" pitchFamily="2" charset="-122"/>
+            </a:endParaRPr>
+          </a:p>
+          <a:p>
+            <a:pPr algn="ctr"/>
+            <a:r>
+              <a:rPr lang="zh-CN" altLang="en-US" sz="2800" b="1" dirty="0">
+                <a:solidFill>
+                  <a:schemeClr val="tx1">
+                    <a:lumMod val="50000"/>
+                    <a:lumOff val="50000"/>
+                  </a:schemeClr>
+                </a:solidFill>
+                <a:latin typeface="华文楷体" panose="02010600040101010101" pitchFamily="2" charset="-122"/>
+                <a:ea typeface="华文楷体" panose="02010600040101010101" pitchFamily="2" charset="-122"/>
+              </a:rPr>
+              <a:t>企业文化</a:t>
+            </a:r>
+            <a:r>
+              <a:rPr lang="en-US" altLang="zh-CN" sz="2800" b="1" dirty="0">
+                <a:solidFill>
+                  <a:schemeClr val="tx1">
+                    <a:lumMod val="50000"/>
+                    <a:lumOff val="50000"/>
+                  </a:schemeClr>
+                </a:solidFill>
+                <a:latin typeface="华文楷体" panose="02010600040101010101" pitchFamily="2" charset="-122"/>
+                <a:ea typeface="华文楷体" panose="02010600040101010101" pitchFamily="2" charset="-122"/>
+              </a:rPr>
+              <a:t>/</a:t>
+            </a:r>
+            <a:r>
+              <a:rPr lang="zh-CN" altLang="en-US" sz="2800" b="1" dirty="0">
+                <a:solidFill>
+                  <a:schemeClr val="tx1">
+                    <a:lumMod val="50000"/>
+                    <a:lumOff val="50000"/>
+                  </a:schemeClr>
+                </a:solidFill>
+                <a:latin typeface="华文楷体" panose="02010600040101010101" pitchFamily="2" charset="-122"/>
+                <a:ea typeface="华文楷体" panose="02010600040101010101" pitchFamily="2" charset="-122"/>
+              </a:rPr>
+              <a:t>预算</a:t>
+            </a:r>
+            <a:r>
+              <a:rPr lang="en-US" altLang="zh-CN" sz="2800" b="1" dirty="0">
+                <a:solidFill>
+                  <a:schemeClr val="tx1">
+                    <a:lumMod val="50000"/>
+                    <a:lumOff val="50000"/>
+                  </a:schemeClr>
+                </a:solidFill>
+                <a:latin typeface="华文楷体" panose="02010600040101010101" pitchFamily="2" charset="-122"/>
+                <a:ea typeface="华文楷体" panose="02010600040101010101" pitchFamily="2" charset="-122"/>
+              </a:rPr>
+              <a:t>/PR</a:t>
+            </a:r>
+            <a:endParaRPr lang="zh-CN" altLang="en-US" sz="2800" b="1" dirty="0">
+              <a:solidFill>
+                <a:schemeClr val="tx1">
+                  <a:lumMod val="50000"/>
+                  <a:lumOff val="50000"/>
+                </a:schemeClr>
+              </a:solidFill>
+              <a:latin typeface="华文楷体" panose="02010600040101010101" pitchFamily="2" charset="-122"/>
+              <a:ea typeface="华文楷体" panose="02010600040101010101" pitchFamily="2" charset="-122"/>
+            </a:endParaRPr>
+          </a:p>
+        </p:txBody>
+      </p:sp>
+      <p:sp>
+        <p:nvSpPr>
+          <p:cNvPr id="18" name="矩形 17">
+            <a:extLst>
+              <a:ext uri="{FF2B5EF4-FFF2-40B4-BE49-F238E27FC236}">
+                <a16:creationId xmlns:a16="http://schemas.microsoft.com/office/drawing/2014/main" id="{B340F255-7DD4-4061-9D94-790399641707}"/>
+              </a:ext>
+            </a:extLst>
+          </p:cNvPr>
+          <p:cNvSpPr/>
+          <p:nvPr/>
+        </p:nvSpPr>
+        <p:spPr>
+          <a:xfrm>
+            <a:off x="1265390" y="3886200"/>
+            <a:ext cx="4830609" cy="1295400"/>
+          </a:xfrm>
+          <a:prstGeom prst="rect">
+            <a:avLst/>
+          </a:prstGeom>
+          <a:solidFill>
+            <a:srgbClr val="F4C38B"/>
+          </a:solidFill>
+          <a:ln>
+            <a:noFill/>
+          </a:ln>
+        </p:spPr>
+        <p:style>
+          <a:lnRef idx="2">
+            <a:schemeClr val="accent1">
+              <a:shade val="50000"/>
+            </a:schemeClr>
+          </a:lnRef>
+          <a:fillRef idx="1">
+            <a:schemeClr val="accent1"/>
+          </a:fillRef>
+          <a:effectRef idx="0">
+            <a:schemeClr val="accent1"/>
+          </a:effectRef>
+          <a:fontRef idx="minor">
+            <a:schemeClr val="lt1"/>
+          </a:fontRef>
+        </p:style>
+        <p:txBody>
+          <a:bodyPr rtlCol="0" anchor="ctr"/>
+          <a:lstStyle/>
+          <a:p>
+            <a:pPr algn="ctr"/>
+            <a:r>
+              <a:rPr lang="en-US" altLang="zh-CN" sz="2400" b="1" dirty="0">
+                <a:latin typeface="华文楷体" panose="02010600040101010101" pitchFamily="2" charset="-122"/>
+                <a:ea typeface="华文楷体" panose="02010600040101010101" pitchFamily="2" charset="-122"/>
+              </a:rPr>
+              <a:t>Step2/3 </a:t>
+            </a:r>
+            <a:r>
+              <a:rPr lang="zh-CN" altLang="en-US" sz="2400" b="1" dirty="0">
+                <a:latin typeface="华文楷体" panose="02010600040101010101" pitchFamily="2" charset="-122"/>
+                <a:ea typeface="华文楷体" panose="02010600040101010101" pitchFamily="2" charset="-122"/>
+              </a:rPr>
+              <a:t>行政外协专员</a:t>
+            </a:r>
+          </a:p>
+        </p:txBody>
+      </p:sp>
+      <p:sp>
+        <p:nvSpPr>
+          <p:cNvPr id="19" name="矩形 18">
+            <a:extLst>
+              <a:ext uri="{FF2B5EF4-FFF2-40B4-BE49-F238E27FC236}">
+                <a16:creationId xmlns:a16="http://schemas.microsoft.com/office/drawing/2014/main" id="{3B2DD387-06E1-442E-8C2B-9D25C84C4865}"/>
+              </a:ext>
+            </a:extLst>
+          </p:cNvPr>
+          <p:cNvSpPr/>
+          <p:nvPr/>
+        </p:nvSpPr>
+        <p:spPr>
+          <a:xfrm>
+            <a:off x="6096000" y="3886200"/>
+            <a:ext cx="3886200" cy="1295400"/>
+          </a:xfrm>
+          <a:prstGeom prst="rect">
+            <a:avLst/>
+          </a:prstGeom>
+          <a:noFill/>
+          <a:ln w="28575">
+            <a:solidFill>
+              <a:schemeClr val="tx1"/>
+            </a:solidFill>
+            <a:prstDash val="dash"/>
+          </a:ln>
+        </p:spPr>
+        <p:style>
+          <a:lnRef idx="2">
+            <a:schemeClr val="accent1">
+              <a:shade val="50000"/>
+            </a:schemeClr>
+          </a:lnRef>
+          <a:fillRef idx="1">
+            <a:schemeClr val="accent1"/>
+          </a:fillRef>
+          <a:effectRef idx="0">
+            <a:schemeClr val="accent1"/>
+          </a:effectRef>
+          <a:fontRef idx="minor">
+            <a:schemeClr val="lt1"/>
+          </a:fontRef>
+        </p:style>
+        <p:txBody>
+          <a:bodyPr rtlCol="0" anchor="ctr"/>
+          <a:lstStyle/>
+          <a:p>
+            <a:pPr algn="ctr"/>
+            <a:r>
+              <a:rPr lang="en-US" altLang="zh-CN" sz="2400" b="1" dirty="0">
+                <a:solidFill>
+                  <a:schemeClr val="tx1">
+                    <a:lumMod val="50000"/>
+                    <a:lumOff val="50000"/>
+                  </a:schemeClr>
+                </a:solidFill>
+                <a:latin typeface="华文楷体" panose="02010600040101010101" pitchFamily="2" charset="-122"/>
+                <a:ea typeface="华文楷体" panose="02010600040101010101" pitchFamily="2" charset="-122"/>
+              </a:rPr>
+              <a:t>Step4 </a:t>
+            </a:r>
+            <a:r>
+              <a:rPr lang="zh-CN" altLang="en-US" sz="2400" b="1" dirty="0">
+                <a:solidFill>
+                  <a:schemeClr val="tx1">
+                    <a:lumMod val="50000"/>
+                    <a:lumOff val="50000"/>
+                  </a:schemeClr>
+                </a:solidFill>
+                <a:latin typeface="华文楷体" panose="02010600040101010101" pitchFamily="2" charset="-122"/>
+                <a:ea typeface="华文楷体" panose="02010600040101010101" pitchFamily="2" charset="-122"/>
+              </a:rPr>
+              <a:t>中阶管理能力</a:t>
+            </a:r>
+            <a:endParaRPr lang="en-US" altLang="zh-CN" sz="2400" b="1" dirty="0">
+              <a:solidFill>
+                <a:schemeClr val="tx1">
+                  <a:lumMod val="50000"/>
+                  <a:lumOff val="50000"/>
+                </a:schemeClr>
+              </a:solidFill>
+              <a:latin typeface="华文楷体" panose="02010600040101010101" pitchFamily="2" charset="-122"/>
+              <a:ea typeface="华文楷体" panose="02010600040101010101" pitchFamily="2" charset="-122"/>
+            </a:endParaRPr>
+          </a:p>
+          <a:p>
+            <a:pPr algn="ctr"/>
+            <a:r>
+              <a:rPr lang="zh-CN" altLang="en-US" sz="2400" b="1" dirty="0">
+                <a:solidFill>
+                  <a:schemeClr val="tx1">
+                    <a:lumMod val="50000"/>
+                    <a:lumOff val="50000"/>
+                  </a:schemeClr>
+                </a:solidFill>
+                <a:latin typeface="华文楷体" panose="02010600040101010101" pitchFamily="2" charset="-122"/>
+                <a:ea typeface="华文楷体" panose="02010600040101010101" pitchFamily="2" charset="-122"/>
+              </a:rPr>
+              <a:t>向上管理</a:t>
+            </a:r>
+            <a:r>
+              <a:rPr lang="en-US" altLang="zh-CN" sz="2400" b="1" dirty="0">
+                <a:solidFill>
+                  <a:schemeClr val="tx1">
+                    <a:lumMod val="50000"/>
+                    <a:lumOff val="50000"/>
+                  </a:schemeClr>
+                </a:solidFill>
+                <a:latin typeface="华文楷体" panose="02010600040101010101" pitchFamily="2" charset="-122"/>
+                <a:ea typeface="华文楷体" panose="02010600040101010101" pitchFamily="2" charset="-122"/>
+              </a:rPr>
+              <a:t>/</a:t>
+            </a:r>
+            <a:r>
+              <a:rPr lang="zh-CN" altLang="en-US" sz="2400" b="1" dirty="0">
+                <a:solidFill>
+                  <a:schemeClr val="tx1">
+                    <a:lumMod val="50000"/>
+                    <a:lumOff val="50000"/>
+                  </a:schemeClr>
+                </a:solidFill>
+                <a:latin typeface="华文楷体" panose="02010600040101010101" pitchFamily="2" charset="-122"/>
+                <a:ea typeface="华文楷体" panose="02010600040101010101" pitchFamily="2" charset="-122"/>
+              </a:rPr>
+              <a:t>目标</a:t>
+            </a:r>
+            <a:r>
+              <a:rPr lang="en-US" altLang="zh-CN" sz="2400" b="1" dirty="0">
+                <a:solidFill>
+                  <a:schemeClr val="tx1">
+                    <a:lumMod val="50000"/>
+                    <a:lumOff val="50000"/>
+                  </a:schemeClr>
+                </a:solidFill>
+                <a:latin typeface="华文楷体" panose="02010600040101010101" pitchFamily="2" charset="-122"/>
+                <a:ea typeface="华文楷体" panose="02010600040101010101" pitchFamily="2" charset="-122"/>
+              </a:rPr>
+              <a:t>/</a:t>
+            </a:r>
+            <a:r>
+              <a:rPr lang="zh-CN" altLang="en-US" sz="2400" b="1" dirty="0">
+                <a:solidFill>
+                  <a:schemeClr val="tx1">
+                    <a:lumMod val="50000"/>
+                    <a:lumOff val="50000"/>
+                  </a:schemeClr>
+                </a:solidFill>
+                <a:latin typeface="华文楷体" panose="02010600040101010101" pitchFamily="2" charset="-122"/>
+                <a:ea typeface="华文楷体" panose="02010600040101010101" pitchFamily="2" charset="-122"/>
+              </a:rPr>
+              <a:t>策略</a:t>
+            </a:r>
+            <a:r>
+              <a:rPr lang="en-US" altLang="zh-CN" sz="2400" b="1" dirty="0">
+                <a:solidFill>
+                  <a:schemeClr val="tx1">
+                    <a:lumMod val="50000"/>
+                    <a:lumOff val="50000"/>
+                  </a:schemeClr>
+                </a:solidFill>
+                <a:latin typeface="华文楷体" panose="02010600040101010101" pitchFamily="2" charset="-122"/>
+                <a:ea typeface="华文楷体" panose="02010600040101010101" pitchFamily="2" charset="-122"/>
+              </a:rPr>
+              <a:t>/</a:t>
+            </a:r>
+            <a:r>
+              <a:rPr lang="zh-CN" altLang="en-US" sz="2400" b="1" dirty="0">
+                <a:solidFill>
+                  <a:schemeClr val="tx1">
+                    <a:lumMod val="50000"/>
+                    <a:lumOff val="50000"/>
+                  </a:schemeClr>
+                </a:solidFill>
+                <a:latin typeface="华文楷体" panose="02010600040101010101" pitchFamily="2" charset="-122"/>
+                <a:ea typeface="华文楷体" panose="02010600040101010101" pitchFamily="2" charset="-122"/>
+              </a:rPr>
+              <a:t>人才配置</a:t>
+            </a:r>
+            <a:r>
+              <a:rPr lang="en-US" altLang="zh-CN" sz="2400" b="1" dirty="0">
+                <a:solidFill>
+                  <a:schemeClr val="tx1">
+                    <a:lumMod val="50000"/>
+                    <a:lumOff val="50000"/>
+                  </a:schemeClr>
+                </a:solidFill>
+                <a:latin typeface="华文楷体" panose="02010600040101010101" pitchFamily="2" charset="-122"/>
+                <a:ea typeface="华文楷体" panose="02010600040101010101" pitchFamily="2" charset="-122"/>
+              </a:rPr>
+              <a:t>/</a:t>
+            </a:r>
+            <a:r>
+              <a:rPr lang="zh-CN" altLang="en-US" sz="2400" b="1" dirty="0">
+                <a:solidFill>
+                  <a:schemeClr val="tx1">
+                    <a:lumMod val="50000"/>
+                    <a:lumOff val="50000"/>
+                  </a:schemeClr>
+                </a:solidFill>
+                <a:latin typeface="华文楷体" panose="02010600040101010101" pitchFamily="2" charset="-122"/>
+                <a:ea typeface="华文楷体" panose="02010600040101010101" pitchFamily="2" charset="-122"/>
+              </a:rPr>
+              <a:t>资源协调</a:t>
+            </a:r>
+          </a:p>
+        </p:txBody>
+      </p:sp>
+      <p:sp>
+        <p:nvSpPr>
+          <p:cNvPr id="7" name="矩形 6">
+            <a:extLst>
+              <a:ext uri="{FF2B5EF4-FFF2-40B4-BE49-F238E27FC236}">
+                <a16:creationId xmlns:a16="http://schemas.microsoft.com/office/drawing/2014/main" id="{05B6FF81-F678-41DF-B8E8-441A08B49C5A}"/>
+              </a:ext>
+            </a:extLst>
+          </p:cNvPr>
+          <p:cNvSpPr/>
+          <p:nvPr/>
+        </p:nvSpPr>
+        <p:spPr>
+          <a:xfrm>
+            <a:off x="1466850" y="590549"/>
+            <a:ext cx="1657350" cy="1819275"/>
+          </a:xfrm>
+          <a:prstGeom prst="rect">
+            <a:avLst/>
+          </a:prstGeom>
+        </p:spPr>
+        <p:style>
+          <a:lnRef idx="2">
+            <a:schemeClr val="accent1">
+              <a:shade val="50000"/>
+            </a:schemeClr>
+          </a:lnRef>
+          <a:fillRef idx="1">
+            <a:schemeClr val="accent1"/>
+          </a:fillRef>
+          <a:effectRef idx="0">
+            <a:schemeClr val="accent1"/>
+          </a:effectRef>
+          <a:fontRef idx="minor">
+            <a:schemeClr val="lt1"/>
+          </a:fontRef>
+        </p:style>
+        <p:txBody>
+          <a:bodyPr rtlCol="0" anchor="ctr"/>
+          <a:lstStyle/>
+          <a:p>
+            <a:pPr algn="ctr"/>
+            <a:r>
+              <a:rPr lang="zh-CN" altLang="en-US" sz="2400" dirty="0">
+                <a:latin typeface="华文楷体" panose="02010600040101010101" pitchFamily="2" charset="-122"/>
+                <a:ea typeface="华文楷体" panose="02010600040101010101" pitchFamily="2" charset="-122"/>
+              </a:rPr>
+              <a:t>董事长</a:t>
+            </a:r>
+            <a:endParaRPr lang="en-US" altLang="zh-CN" sz="2400" dirty="0">
+              <a:latin typeface="华文楷体" panose="02010600040101010101" pitchFamily="2" charset="-122"/>
+              <a:ea typeface="华文楷体" panose="02010600040101010101" pitchFamily="2" charset="-122"/>
+            </a:endParaRPr>
+          </a:p>
+          <a:p>
+            <a:pPr algn="ctr"/>
+            <a:r>
+              <a:rPr lang="zh-CN" altLang="en-US" sz="2400" dirty="0">
+                <a:latin typeface="华文楷体" panose="02010600040101010101" pitchFamily="2" charset="-122"/>
+                <a:ea typeface="华文楷体" panose="02010600040101010101" pitchFamily="2" charset="-122"/>
+              </a:rPr>
+              <a:t>助理</a:t>
+            </a:r>
+          </a:p>
+        </p:txBody>
+      </p:sp>
+      <p:sp>
+        <p:nvSpPr>
+          <p:cNvPr id="13" name="箭头: 右弧形 12">
+            <a:extLst>
+              <a:ext uri="{FF2B5EF4-FFF2-40B4-BE49-F238E27FC236}">
+                <a16:creationId xmlns:a16="http://schemas.microsoft.com/office/drawing/2014/main" id="{C0406A8E-8C6D-4DDF-8785-BF6A78F61C48}"/>
+              </a:ext>
+            </a:extLst>
+          </p:cNvPr>
+          <p:cNvSpPr/>
+          <p:nvPr/>
+        </p:nvSpPr>
+        <p:spPr>
+          <a:xfrm rot="10800000">
+            <a:off x="252548" y="1123405"/>
+            <a:ext cx="1113571" cy="4796381"/>
+          </a:xfrm>
+          <a:prstGeom prst="curvedLeftArrow">
+            <a:avLst>
+              <a:gd name="adj1" fmla="val 3046"/>
+              <a:gd name="adj2" fmla="val 74075"/>
+              <a:gd name="adj3" fmla="val 25000"/>
+            </a:avLst>
+          </a:prstGeom>
+        </p:spPr>
+        <p:style>
+          <a:lnRef idx="2">
+            <a:schemeClr val="accent1">
+              <a:shade val="50000"/>
+            </a:schemeClr>
+          </a:lnRef>
+          <a:fillRef idx="1">
+            <a:schemeClr val="accent1"/>
+          </a:fillRef>
+          <a:effectRef idx="0">
+            <a:schemeClr val="accent1"/>
+          </a:effectRef>
+          <a:fontRef idx="minor">
+            <a:schemeClr val="lt1"/>
+          </a:fontRef>
+        </p:style>
+        <p:txBody>
+          <a:bodyPr rtlCol="0" anchor="ctr"/>
+          <a:lstStyle/>
+          <a:p>
+            <a:pPr algn="ctr"/>
+            <a:endParaRPr lang="zh-CN" altLang="en-US">
+              <a:solidFill>
+                <a:schemeClr val="tx1"/>
+              </a:solidFill>
+            </a:endParaRPr>
+          </a:p>
+        </p:txBody>
+      </p:sp>
+      <p:sp>
+        <p:nvSpPr>
+          <p:cNvPr id="2" name="对话气泡: 矩形 1">
+            <a:extLst>
+              <a:ext uri="{FF2B5EF4-FFF2-40B4-BE49-F238E27FC236}">
+                <a16:creationId xmlns:a16="http://schemas.microsoft.com/office/drawing/2014/main" id="{47E5C73B-11EA-4C0A-BA33-D5D2927039D5}"/>
+              </a:ext>
+            </a:extLst>
+          </p:cNvPr>
+          <p:cNvSpPr/>
+          <p:nvPr/>
+        </p:nvSpPr>
+        <p:spPr>
+          <a:xfrm>
+            <a:off x="6487886" y="5589814"/>
+            <a:ext cx="3657600" cy="859971"/>
+          </a:xfrm>
+          <a:prstGeom prst="wedgeRectCallout">
+            <a:avLst>
+              <a:gd name="adj1" fmla="val -67976"/>
+              <a:gd name="adj2" fmla="val -5348"/>
+            </a:avLst>
+          </a:prstGeom>
+        </p:spPr>
+        <p:style>
+          <a:lnRef idx="2">
+            <a:schemeClr val="accent1">
+              <a:shade val="50000"/>
+            </a:schemeClr>
+          </a:lnRef>
+          <a:fillRef idx="1">
+            <a:schemeClr val="accent1"/>
+          </a:fillRef>
+          <a:effectRef idx="0">
+            <a:schemeClr val="accent1"/>
+          </a:effectRef>
+          <a:fontRef idx="minor">
+            <a:schemeClr val="lt1"/>
+          </a:fontRef>
+        </p:style>
+        <p:txBody>
+          <a:bodyPr rtlCol="0" anchor="ctr"/>
+          <a:lstStyle/>
+          <a:p>
+            <a:pPr algn="ctr"/>
+            <a:r>
+              <a:rPr lang="zh-CN" altLang="en-US" b="1" dirty="0"/>
+              <a:t>绝对短板</a:t>
+            </a:r>
+          </a:p>
+        </p:txBody>
+      </p:sp>
+    </p:spTree>
+    <p:extLst>
+      <p:ext uri="{BB962C8B-B14F-4D97-AF65-F5344CB8AC3E}">
+        <p14:creationId xmlns:p14="http://schemas.microsoft.com/office/powerpoint/2010/main" val="1505496308"/>
+      </p:ext>
+    </p:extLst>
+  </p:cSld>
+  <p:clrMapOvr>
+    <a:masterClrMapping/>
+  </p:clrMapOvr>
+</p:sld>
+</file>
+
 <file path=ppt/theme/theme1.xml><?xml version="1.0" encoding="utf-8"?>
 <a:theme xmlns:a="http://schemas.openxmlformats.org/drawingml/2006/main" name="Office 主题​​">
   <a:themeElements>

</xml_diff>